<commit_message>
added all of the queries
</commit_message>
<xml_diff>
--- a/data_base_normalization.pptx
+++ b/data_base_normalization.pptx
@@ -203,7 +203,7 @@
           <a:p>
             <a:fld id="{2299C1EC-A3C1-9B4C-8E74-6284A30CE1C6}" type="datetimeFigureOut">
               <a:rPr lang="en-US" smtClean="0"/>
-              <a:t>5/5/25</a:t>
+              <a:t>5/7/25</a:t>
             </a:fld>
             <a:endParaRPr lang="en-US"/>
           </a:p>
@@ -1121,7 +1121,7 @@
           <a:p>
             <a:fld id="{0DFFD55B-AC3A-F346-8A62-4C3F627E4C33}" type="datetimeFigureOut">
               <a:rPr lang="en-US" smtClean="0"/>
-              <a:t>5/5/25</a:t>
+              <a:t>5/7/25</a:t>
             </a:fld>
             <a:endParaRPr lang="en-US"/>
           </a:p>
@@ -1319,7 +1319,7 @@
           <a:p>
             <a:fld id="{0DFFD55B-AC3A-F346-8A62-4C3F627E4C33}" type="datetimeFigureOut">
               <a:rPr lang="en-US" smtClean="0"/>
-              <a:t>5/5/25</a:t>
+              <a:t>5/7/25</a:t>
             </a:fld>
             <a:endParaRPr lang="en-US"/>
           </a:p>
@@ -1527,7 +1527,7 @@
           <a:p>
             <a:fld id="{0DFFD55B-AC3A-F346-8A62-4C3F627E4C33}" type="datetimeFigureOut">
               <a:rPr lang="en-US" smtClean="0"/>
-              <a:t>5/5/25</a:t>
+              <a:t>5/7/25</a:t>
             </a:fld>
             <a:endParaRPr lang="en-US"/>
           </a:p>
@@ -1725,7 +1725,7 @@
           <a:p>
             <a:fld id="{0DFFD55B-AC3A-F346-8A62-4C3F627E4C33}" type="datetimeFigureOut">
               <a:rPr lang="en-US" smtClean="0"/>
-              <a:t>5/5/25</a:t>
+              <a:t>5/7/25</a:t>
             </a:fld>
             <a:endParaRPr lang="en-US"/>
           </a:p>
@@ -2000,7 +2000,7 @@
           <a:p>
             <a:fld id="{0DFFD55B-AC3A-F346-8A62-4C3F627E4C33}" type="datetimeFigureOut">
               <a:rPr lang="en-US" smtClean="0"/>
-              <a:t>5/5/25</a:t>
+              <a:t>5/7/25</a:t>
             </a:fld>
             <a:endParaRPr lang="en-US"/>
           </a:p>
@@ -2265,7 +2265,7 @@
           <a:p>
             <a:fld id="{0DFFD55B-AC3A-F346-8A62-4C3F627E4C33}" type="datetimeFigureOut">
               <a:rPr lang="en-US" smtClean="0"/>
-              <a:t>5/5/25</a:t>
+              <a:t>5/7/25</a:t>
             </a:fld>
             <a:endParaRPr lang="en-US"/>
           </a:p>
@@ -2677,7 +2677,7 @@
           <a:p>
             <a:fld id="{0DFFD55B-AC3A-F346-8A62-4C3F627E4C33}" type="datetimeFigureOut">
               <a:rPr lang="en-US" smtClean="0"/>
-              <a:t>5/5/25</a:t>
+              <a:t>5/7/25</a:t>
             </a:fld>
             <a:endParaRPr lang="en-US"/>
           </a:p>
@@ -2818,7 +2818,7 @@
           <a:p>
             <a:fld id="{0DFFD55B-AC3A-F346-8A62-4C3F627E4C33}" type="datetimeFigureOut">
               <a:rPr lang="en-US" smtClean="0"/>
-              <a:t>5/5/25</a:t>
+              <a:t>5/7/25</a:t>
             </a:fld>
             <a:endParaRPr lang="en-US"/>
           </a:p>
@@ -2931,7 +2931,7 @@
           <a:p>
             <a:fld id="{0DFFD55B-AC3A-F346-8A62-4C3F627E4C33}" type="datetimeFigureOut">
               <a:rPr lang="en-US" smtClean="0"/>
-              <a:t>5/5/25</a:t>
+              <a:t>5/7/25</a:t>
             </a:fld>
             <a:endParaRPr lang="en-US"/>
           </a:p>
@@ -3242,7 +3242,7 @@
           <a:p>
             <a:fld id="{0DFFD55B-AC3A-F346-8A62-4C3F627E4C33}" type="datetimeFigureOut">
               <a:rPr lang="en-US" smtClean="0"/>
-              <a:t>5/5/25</a:t>
+              <a:t>5/7/25</a:t>
             </a:fld>
             <a:endParaRPr lang="en-US"/>
           </a:p>
@@ -3530,7 +3530,7 @@
           <a:p>
             <a:fld id="{0DFFD55B-AC3A-F346-8A62-4C3F627E4C33}" type="datetimeFigureOut">
               <a:rPr lang="en-US" smtClean="0"/>
-              <a:t>5/5/25</a:t>
+              <a:t>5/7/25</a:t>
             </a:fld>
             <a:endParaRPr lang="en-US"/>
           </a:p>
@@ -3771,7 +3771,7 @@
           <a:p>
             <a:fld id="{0DFFD55B-AC3A-F346-8A62-4C3F627E4C33}" type="datetimeFigureOut">
               <a:rPr lang="en-US" smtClean="0"/>
-              <a:t>5/5/25</a:t>
+              <a:t>5/7/25</a:t>
             </a:fld>
             <a:endParaRPr lang="en-US"/>
           </a:p>
@@ -19442,7 +19442,7 @@
         <p:spPr>
           <a:xfrm>
             <a:off x="208672" y="297040"/>
-            <a:ext cx="11678529" cy="5447645"/>
+            <a:ext cx="11678529" cy="5262979"/>
           </a:xfrm>
           <a:prstGeom prst="rect">
             <a:avLst/>
@@ -19537,95 +19537,43 @@
               <a:buChar char="•"/>
             </a:pPr>
             <a:r>
+              <a:rPr lang="en-US" sz="1200" b="1" dirty="0" err="1"/>
+              <a:t>Mo_Codes</a:t>
+            </a:r>
+            <a:r>
               <a:rPr lang="en-US" sz="1200" b="1" dirty="0"/>
-              <a:t>Crime Codes never used in any incident (Set Theory)</a:t>
+              <a:t> never used in any incident (Set Theory)</a:t>
             </a:r>
             <a:br>
               <a:rPr lang="en-US" sz="1200" dirty="0"/>
             </a:br>
             <a:r>
               <a:rPr lang="en-US" sz="1200" dirty="0"/>
-              <a:t>This query will identify and display all crime codes that were never used in any reported incident. The tables used will </a:t>
+              <a:t>This query identifies and displays all Modus Operandi (MO) codes that have been defined in the </a:t>
             </a:r>
             <a:r>
               <a:rPr lang="en-US" sz="1200" dirty="0" err="1"/>
-              <a:t>crime_code_description</a:t>
+              <a:t>mocode_descriptiontable</a:t>
             </a:r>
             <a:r>
               <a:rPr lang="en-US" sz="1200" dirty="0"/>
-              <a:t> and </a:t>
+              <a:t> but have never been used in any reported incident. We perform a set difference operation by selecting all MO codes from </a:t>
             </a:r>
             <a:r>
               <a:rPr lang="en-US" sz="1200" dirty="0" err="1"/>
-              <a:t>crime_code</a:t>
+              <a:t>mocode_description</a:t>
             </a:r>
             <a:r>
               <a:rPr lang="en-US" sz="1200" dirty="0"/>
-              <a:t>. I will do a set different where I want all of the crime codes in </a:t>
+              <a:t> and subtracting the set of MO codes that appear in the </a:t>
             </a:r>
             <a:r>
               <a:rPr lang="en-US" sz="1200" dirty="0" err="1"/>
-              <a:t>crime_code_description</a:t>
+              <a:t>mocode</a:t>
             </a:r>
             <a:r>
               <a:rPr lang="en-US" sz="1200" dirty="0"/>
-              <a:t> that are not in </a:t>
-            </a:r>
-            <a:r>
-              <a:rPr lang="en-US" sz="1200" dirty="0" err="1"/>
-              <a:t>crime_codes</a:t>
-            </a:r>
-            <a:r>
-              <a:rPr lang="en-US" sz="1200" dirty="0"/>
-              <a:t> (</a:t>
-            </a:r>
-            <a:r>
-              <a:rPr lang="en-US" sz="1200" dirty="0" err="1"/>
-              <a:t>crime_code_description</a:t>
-            </a:r>
-            <a:r>
-              <a:rPr lang="en-US" sz="1200" dirty="0"/>
-              <a:t> MINUS </a:t>
-            </a:r>
-            <a:r>
-              <a:rPr lang="en-US" sz="1200" dirty="0" err="1"/>
-              <a:t>crime_code</a:t>
-            </a:r>
-            <a:r>
-              <a:rPr lang="en-US" sz="1200" dirty="0"/>
-              <a:t>). I plan to select all of the </a:t>
-            </a:r>
-            <a:r>
-              <a:rPr lang="en-US" sz="1200" dirty="0" err="1"/>
-              <a:t>Crm_Cd</a:t>
-            </a:r>
-            <a:r>
-              <a:rPr lang="en-US" sz="1200" dirty="0"/>
-              <a:t> from </a:t>
-            </a:r>
-            <a:r>
-              <a:rPr lang="en-US" sz="1200" dirty="0" err="1"/>
-              <a:t>crime_code_description</a:t>
-            </a:r>
-            <a:r>
-              <a:rPr lang="en-US" sz="1200" dirty="0"/>
-              <a:t> then subtract the set of </a:t>
-            </a:r>
-            <a:r>
-              <a:rPr lang="en-US" sz="1200" dirty="0" err="1"/>
-              <a:t>Crm_Cd</a:t>
-            </a:r>
-            <a:r>
-              <a:rPr lang="en-US" sz="1200" dirty="0"/>
-              <a:t> that appear in the </a:t>
-            </a:r>
-            <a:r>
-              <a:rPr lang="en-US" sz="1200" dirty="0" err="1"/>
-              <a:t>crime_code</a:t>
-            </a:r>
-            <a:r>
-              <a:rPr lang="en-US" sz="1200" dirty="0"/>
-              <a:t> table and then return the remaining crime codes with there descriptions.</a:t>
+              <a:t> table. The result is a list of unused MO codes along with their descriptions.</a:t>
             </a:r>
           </a:p>
           <a:p>
@@ -19637,15 +19585,37 @@
               <a:buChar char="•"/>
             </a:pPr>
             <a:r>
-              <a:rPr lang="en-US" sz="1200" b="1" dirty="0"/>
-              <a:t>Annual crime trends (Aggregations)</a:t>
+              <a:rPr lang="en-US" sz="1200" b="1" i="0" u="none" strike="noStrike" dirty="0">
+                <a:solidFill>
+                  <a:srgbClr val="000000"/>
+                </a:solidFill>
+                <a:effectLst/>
+                <a:latin typeface="-webkit-standard"/>
+              </a:rPr>
+              <a:t>Monthly Crime Counts per Reporting District (Aggregation with Join)</a:t>
             </a:r>
             <a:br>
               <a:rPr lang="en-US" sz="1200" dirty="0"/>
             </a:br>
             <a:r>
               <a:rPr lang="en-US" sz="1200" dirty="0"/>
-              <a:t>This query will count how many incidents were reported in each year. The table that will be used is the incident table. The column that will be used is the </a:t>
+              <a:t>This query will display the number of incidents per reporting district every month. The table that will be used are </a:t>
+            </a:r>
+            <a:r>
+              <a:rPr lang="en-US" sz="1200" dirty="0" err="1"/>
+              <a:t>rpt_no</a:t>
+            </a:r>
+            <a:r>
+              <a:rPr lang="en-US" sz="1200" dirty="0"/>
+              <a:t> and incident. I will attempt a join between the incident table and the </a:t>
+            </a:r>
+            <a:r>
+              <a:rPr lang="en-US" sz="1200" dirty="0" err="1"/>
+              <a:t>rpt_no</a:t>
+            </a:r>
+            <a:r>
+              <a:rPr lang="en-US" sz="1200" dirty="0"/>
+              <a:t> table where RPT_DIST_NO is the same. Then extract the month from </a:t>
             </a:r>
             <a:r>
               <a:rPr lang="en-US" sz="1200" dirty="0" err="1"/>
@@ -19653,22 +19623,10 @@
             </a:r>
             <a:r>
               <a:rPr lang="en-US" sz="1200" dirty="0"/>
-              <a:t> and we will have to extract the year from that column. The we will use the count method and the the group by method to count the total number of incidents per year and we will group by the year property that was extracted from the </a:t>
-            </a:r>
-            <a:r>
-              <a:rPr lang="en-US" sz="1200" dirty="0" err="1"/>
-              <a:t>Date_OCC</a:t>
-            </a:r>
-            <a:r>
-              <a:rPr lang="en-US" sz="1200" dirty="0"/>
-              <a:t>.</a:t>
+              <a:t> and group by the month and the reporting district.</a:t>
             </a:r>
           </a:p>
           <a:p>
-            <a:pPr marL="285750" indent="-285750">
-              <a:buFont typeface="Arial" panose="020B0604020202020204" pitchFamily="34" charset="0"/>
-              <a:buChar char="•"/>
-            </a:pPr>
             <a:endParaRPr lang="en-US" sz="1200" dirty="0"/>
           </a:p>
           <a:p>
@@ -19706,22 +19664,14 @@
             </a:pPr>
             <a:r>
               <a:rPr lang="en-US" sz="1200" b="1" dirty="0"/>
-              <a:t>Firearm incidents involving </a:t>
-            </a:r>
-            <a:r>
-              <a:rPr lang="en-US" sz="1200" b="1" dirty="0" err="1"/>
-              <a:t>femal</a:t>
-            </a:r>
-            <a:r>
-              <a:rPr lang="en-US" sz="1200" b="1" dirty="0"/>
-              <a:t> victims over time</a:t>
+              <a:t>Firearm incidents involving female victims </a:t>
             </a:r>
             <a:br>
               <a:rPr lang="en-US" sz="1200" dirty="0"/>
             </a:br>
             <a:r>
               <a:rPr lang="en-US" sz="1200" dirty="0"/>
-              <a:t>This query will show incidents that involved firearms and females' victims and it will group them by year to show how many of those incidents were reported in that specific year. The tables that will be used are incident and weapon. I plan to do a join with the incident and weapon table on </a:t>
+              <a:t>This query will show incidents that involved firearms and female victims, and it will group them by month to show how many of those incidents were reported in that specific month. The tables that will be used are incident and weapon. I plan to do a join with the incident and weapon table on </a:t>
             </a:r>
             <a:r>
               <a:rPr lang="en-US" sz="1200" dirty="0" err="1"/>
@@ -19745,7 +19695,7 @@
             </a:r>
             <a:r>
               <a:rPr lang="en-US" sz="1200" dirty="0"/>
-              <a:t> includes firearm related words. After that I will need to extract the year from </a:t>
+              <a:t> includes firearm related words. After that I will need to extract the month from </a:t>
             </a:r>
             <a:r>
               <a:rPr lang="en-US" sz="1200" dirty="0" err="1"/>
@@ -19753,8 +19703,13 @@
             </a:r>
             <a:r>
               <a:rPr lang="en-US" sz="1200" dirty="0"/>
-              <a:t> and then group by that extracted year and count the number of those incidents per year. </a:t>
+              <a:t> and then group by that extracted month and count the number of those incidents </a:t>
             </a:r>
+            <a:r>
+              <a:rPr lang="en-US" sz="1200"/>
+              <a:t>per month. </a:t>
+            </a:r>
+            <a:endParaRPr lang="en-US" sz="1200" dirty="0"/>
           </a:p>
           <a:p>
             <a:endParaRPr lang="en-US" sz="1200" dirty="0"/>

</xml_diff>

<commit_message>
changed some data values in create.sql
</commit_message>
<xml_diff>
--- a/data_base_normalization.pptx
+++ b/data_base_normalization.pptx
@@ -19442,7 +19442,7 @@
         <p:spPr>
           <a:xfrm>
             <a:off x="208672" y="297040"/>
-            <a:ext cx="11678529" cy="5262979"/>
+            <a:ext cx="11678529" cy="5078313"/>
           </a:xfrm>
           <a:prstGeom prst="rect">
             <a:avLst/>
@@ -19468,7 +19468,7 @@
             </a:br>
             <a:r>
               <a:rPr lang="en-US" sz="1200" dirty="0"/>
-              <a:t>This query will find the top 5 most commonly reported crime types across all incidents. The tables that will be used are incident, </a:t>
+              <a:t>This query identifies the top 5 most commonly reported crime types across all incidents. The tables used are incident, </a:t>
             </a:r>
             <a:r>
               <a:rPr lang="en-US" sz="1200" dirty="0" err="1"/>
@@ -19476,7 +19476,7 @@
             </a:r>
             <a:r>
               <a:rPr lang="en-US" sz="1200" dirty="0"/>
-              <a:t>, and </a:t>
+              <a:t>, and </a:t>
             </a:r>
             <a:r>
               <a:rPr lang="en-US" sz="1200" dirty="0" err="1"/>
@@ -19484,7 +19484,7 @@
             </a:r>
             <a:r>
               <a:rPr lang="en-US" sz="1200" dirty="0"/>
-              <a:t>. I plan to do a join on the incident and </a:t>
+              <a:t>. I will join the incident and </a:t>
             </a:r>
             <a:r>
               <a:rPr lang="en-US" sz="1200" dirty="0" err="1"/>
@@ -19492,7 +19492,7 @@
             </a:r>
             <a:r>
               <a:rPr lang="en-US" sz="1200" dirty="0"/>
-              <a:t> table on the column DR_NO. Then with that result do another join with </a:t>
+              <a:t> tables on the DR_NO column. Then, I will join the result with </a:t>
             </a:r>
             <a:r>
               <a:rPr lang="en-US" sz="1200" dirty="0" err="1"/>
@@ -19500,15 +19500,10 @@
             </a:r>
             <a:r>
               <a:rPr lang="en-US" sz="1200" dirty="0"/>
-              <a:t> to get the description of the crime. I will then count the frequency of each crime code then sort and display the top 5.</a:t>
+              <a:t> to retrieve the crime descriptions. Finally, I will count the frequency of each crime description, sort them in descending order, and display the top 5 results.</a:t>
             </a:r>
-            <a:endParaRPr lang="en-US" sz="1200" b="1" dirty="0"/>
           </a:p>
           <a:p>
-            <a:pPr marL="285750" indent="-285750">
-              <a:buFont typeface="Arial" panose="020B0604020202020204" pitchFamily="34" charset="0"/>
-              <a:buChar char="•"/>
-            </a:pPr>
             <a:endParaRPr lang="en-US" sz="1200" b="1" dirty="0"/>
           </a:p>
           <a:p>
@@ -19525,7 +19520,7 @@
             </a:br>
             <a:r>
               <a:rPr lang="en-US" sz="1200" dirty="0"/>
-              <a:t>List all LAPD divisions and the number of incidents, including those that reported non incidents. I plan to do a left join from the area table to and the incident table using AREA. Then I plan the group by AREA to count incidents. I plan to display even the areas that have 0 incidents.</a:t>
+              <a:t>This query lists all LAPD divisions along with the number of incidents reported in each, including divisions with zero incidents. I will perform a LEFT JOIN from the area table to the incident table using the AREA column. Then, I will group the results by AREA and count the number of incidents per division, ensuring all areas are displayed even if they had no incidents.</a:t>
             </a:r>
           </a:p>
           <a:p>
@@ -19549,15 +19544,7 @@
             </a:br>
             <a:r>
               <a:rPr lang="en-US" sz="1200" dirty="0"/>
-              <a:t>This query identifies and displays all Modus Operandi (MO) codes that have been defined in the </a:t>
-            </a:r>
-            <a:r>
-              <a:rPr lang="en-US" sz="1200" dirty="0" err="1"/>
-              <a:t>mocode_descriptiontable</a:t>
-            </a:r>
-            <a:r>
-              <a:rPr lang="en-US" sz="1200" dirty="0"/>
-              <a:t> but have never been used in any reported incident. We perform a set difference operation by selecting all MO codes from </a:t>
+              <a:t>This query identifies and displays all Modus Operandi (MO) codes that are defined in the </a:t>
             </a:r>
             <a:r>
               <a:rPr lang="en-US" sz="1200" dirty="0" err="1"/>
@@ -19565,7 +19552,15 @@
             </a:r>
             <a:r>
               <a:rPr lang="en-US" sz="1200" dirty="0"/>
-              <a:t> and subtracting the set of MO codes that appear in the </a:t>
+              <a:t> table but have never been used in any reported incident. This is a set difference operation: selecting all MO codes from </a:t>
+            </a:r>
+            <a:r>
+              <a:rPr lang="en-US" sz="1200" dirty="0" err="1"/>
+              <a:t>mocode_description</a:t>
+            </a:r>
+            <a:r>
+              <a:rPr lang="en-US" sz="1200" dirty="0"/>
+              <a:t> and subtracting those that appear in the </a:t>
             </a:r>
             <a:r>
               <a:rPr lang="en-US" sz="1200" dirty="0" err="1"/>
@@ -19599,7 +19594,7 @@
             </a:br>
             <a:r>
               <a:rPr lang="en-US" sz="1200" dirty="0"/>
-              <a:t>This query will display the number of incidents per reporting district every month. The table that will be used are </a:t>
+              <a:t>This query displays the number of incidents reported in each reporting district per month. The tables used are </a:t>
             </a:r>
             <a:r>
               <a:rPr lang="en-US" sz="1200" dirty="0" err="1"/>
@@ -19607,7 +19602,7 @@
             </a:r>
             <a:r>
               <a:rPr lang="en-US" sz="1200" dirty="0"/>
-              <a:t> and incident. I will attempt a join between the incident table and the </a:t>
+              <a:t> and incident. I will join the incident table with the </a:t>
             </a:r>
             <a:r>
               <a:rPr lang="en-US" sz="1200" dirty="0" err="1"/>
@@ -19615,15 +19610,7 @@
             </a:r>
             <a:r>
               <a:rPr lang="en-US" sz="1200" dirty="0"/>
-              <a:t> table where RPT_DIST_NO is the same. Then extract the month from </a:t>
-            </a:r>
-            <a:r>
-              <a:rPr lang="en-US" sz="1200" dirty="0" err="1"/>
-              <a:t>Date_OCC</a:t>
-            </a:r>
-            <a:r>
-              <a:rPr lang="en-US" sz="1200" dirty="0"/>
-              <a:t> and group by the month and the reporting district.</a:t>
+              <a:t> table using the RPT_DIST_NO column, extract the month from DATE_OCC, and group the results by both reporting district and month.</a:t>
             </a:r>
           </a:p>
           <a:p>
@@ -19643,7 +19630,15 @@
             </a:br>
             <a:r>
               <a:rPr lang="en-US" sz="1200" dirty="0"/>
-              <a:t>This query will show all of the incidents involving a firearm. The tables that will be used will be incident and weapon. I plan to do a join on incident and weapon using </a:t>
+              <a:t>This query shows all incidents involving a firearm. The tables used are incident and weapon. I will join the </a:t>
+            </a:r>
+            <a:r>
+              <a:rPr lang="en-US" sz="1200" dirty="0" err="1"/>
+              <a:t>incidentand</a:t>
+            </a:r>
+            <a:r>
+              <a:rPr lang="en-US" sz="1200" dirty="0"/>
+              <a:t> weapon tables on the </a:t>
             </a:r>
             <a:r>
               <a:rPr lang="en-US" sz="1200" dirty="0" err="1"/>
@@ -19651,7 +19646,7 @@
             </a:r>
             <a:r>
               <a:rPr lang="en-US" sz="1200" dirty="0"/>
-              <a:t>. I then will then filter the results for descriptions that include firearm related words (HANDGUN, RIFLE, OTHER FIREARM, . . .).</a:t>
+              <a:t> column, then filter the results to include only those with firearm-related weapon descriptions such as "HANDGUN", "RIFLE", "OTHER FIREARM", and similar.</a:t>
             </a:r>
           </a:p>
           <a:p>
@@ -19671,7 +19666,15 @@
             </a:br>
             <a:r>
               <a:rPr lang="en-US" sz="1200" dirty="0"/>
-              <a:t>This query will show incidents that involved firearms and female victims, and it will group them by month to show how many of those incidents were reported in that specific month. The tables that will be used are incident and weapon. I plan to do a join with the incident and weapon table on </a:t>
+              <a:t>This query shows all firearm-related incidents involving female victims, grouped by month. The tables used are </a:t>
+            </a:r>
+            <a:r>
+              <a:rPr lang="en-US" sz="1200" dirty="0" err="1"/>
+              <a:t>incidentand</a:t>
+            </a:r>
+            <a:r>
+              <a:rPr lang="en-US" sz="1200" dirty="0"/>
+              <a:t> weapon. I will join these tables on the </a:t>
             </a:r>
             <a:r>
               <a:rPr lang="en-US" sz="1200" dirty="0" err="1"/>
@@ -19679,7 +19682,7 @@
             </a:r>
             <a:r>
               <a:rPr lang="en-US" sz="1200" dirty="0"/>
-              <a:t>. From there I plan to filter the results to include only those incidents where </a:t>
+              <a:t> column and filter for records where </a:t>
             </a:r>
             <a:r>
               <a:rPr lang="en-US" sz="1200" dirty="0" err="1"/>
@@ -19687,31 +19690,12 @@
             </a:r>
             <a:r>
               <a:rPr lang="en-US" sz="1200" dirty="0"/>
-              <a:t> = ‘F’ and where the </a:t>
-            </a:r>
-            <a:r>
-              <a:rPr lang="en-US" sz="1200" dirty="0" err="1"/>
-              <a:t>Weapon_Desc</a:t>
-            </a:r>
-            <a:r>
-              <a:rPr lang="en-US" sz="1200" dirty="0"/>
-              <a:t> includes firearm related words. After that I will need to extract the month from </a:t>
-            </a:r>
-            <a:r>
-              <a:rPr lang="en-US" sz="1200" dirty="0" err="1"/>
-              <a:t>Date_OCC</a:t>
-            </a:r>
-            <a:r>
-              <a:rPr lang="en-US" sz="1200" dirty="0"/>
-              <a:t> and then group by that extracted month and count the number of those incidents </a:t>
+              <a:t> = 'F' and the weapon description includes firearm-related terms. </a:t>
             </a:r>
             <a:r>
               <a:rPr lang="en-US" sz="1200"/>
-              <a:t>per month. </a:t>
+              <a:t>Then, I will extract the month from DATE_OCC and group the results to count the number of such incidents per month.</a:t>
             </a:r>
-            <a:endParaRPr lang="en-US" sz="1200" dirty="0"/>
-          </a:p>
-          <a:p>
             <a:endParaRPr lang="en-US" sz="1200" dirty="0"/>
           </a:p>
         </p:txBody>

</xml_diff>